<commit_message>
Updated presentation with links to the deployed API
</commit_message>
<xml_diff>
--- a/presentation/Want to talk to R - Call your plumber - Presentation for R meetup.pptx
+++ b/presentation/Want to talk to R - Call your plumber - Presentation for R meetup.pptx
@@ -5,7 +5,7 @@
     <p:sldMasterId id="2147483840" r:id="rId1"/>
   </p:sldMasterIdLst>
   <p:notesMasterIdLst>
-    <p:notesMasterId r:id="rId11"/>
+    <p:notesMasterId r:id="rId12"/>
   </p:notesMasterIdLst>
   <p:sldIdLst>
     <p:sldId id="256" r:id="rId2"/>
@@ -15,8 +15,9 @@
     <p:sldId id="280" r:id="rId6"/>
     <p:sldId id="281" r:id="rId7"/>
     <p:sldId id="282" r:id="rId8"/>
-    <p:sldId id="270" r:id="rId9"/>
-    <p:sldId id="268" r:id="rId10"/>
+    <p:sldId id="283" r:id="rId9"/>
+    <p:sldId id="270" r:id="rId10"/>
+    <p:sldId id="268" r:id="rId11"/>
   </p:sldIdLst>
   <p:sldSz cx="12192000" cy="6858000"/>
   <p:notesSz cx="6858000" cy="9144000"/>
@@ -950,7 +951,7 @@
 <dgm:dataModel xmlns:dgm="http://schemas.openxmlformats.org/drawingml/2006/diagram" xmlns:a="http://schemas.openxmlformats.org/drawingml/2006/main">
   <dgm:ptLst>
     <dgm:pt modelId="{29B00B90-830D-4A63-BB44-3F64328FAF4E}" type="doc">
-      <dgm:prSet loTypeId="urn:microsoft.com/office/officeart/2005/8/layout/vList3" loCatId="list" qsTypeId="urn:microsoft.com/office/officeart/2005/8/quickstyle/simple1" qsCatId="simple" csTypeId="urn:microsoft.com/office/officeart/2005/8/colors/accent2_1" csCatId="accent2"/>
+      <dgm:prSet loTypeId="urn:microsoft.com/office/officeart/2005/8/layout/vList3" loCatId="list" qsTypeId="urn:microsoft.com/office/officeart/2005/8/quickstyle/simple1" qsCatId="simple" csTypeId="urn:microsoft.com/office/officeart/2005/8/colors/accent2_1" csCatId="accent2" phldr="1"/>
       <dgm:spPr/>
       <dgm:t>
         <a:bodyPr/>
@@ -969,7 +970,7 @@
         <a:p>
           <a:r>
             <a:rPr lang="en-US" dirty="0"/>
-            <a:t>Write your functions</a:t>
+            <a:t>Write</a:t>
           </a:r>
           <a:endParaRPr lang="en-IL" dirty="0"/>
         </a:p>
@@ -1005,10 +1006,10 @@
         <a:lstStyle/>
         <a:p>
           <a:r>
-            <a:rPr lang="en-US"/>
-            <a:t>Decorate a little</a:t>
+            <a:rPr lang="en-US" dirty="0"/>
+            <a:t>Decorate</a:t>
           </a:r>
-          <a:endParaRPr lang="en-IL"/>
+          <a:endParaRPr lang="en-IL" dirty="0"/>
         </a:p>
       </dgm:t>
     </dgm:pt>
@@ -1042,10 +1043,10 @@
         <a:lstStyle/>
         <a:p>
           <a:r>
-            <a:rPr lang="en-US"/>
-            <a:t>Push to the cloud</a:t>
+            <a:rPr lang="en-US" dirty="0"/>
+            <a:t>Deploy</a:t>
           </a:r>
-          <a:endParaRPr lang="en-IL"/>
+          <a:endParaRPr lang="en-IL" dirty="0"/>
         </a:p>
       </dgm:t>
     </dgm:pt>
@@ -1225,12 +1226,12 @@
         </a:fontRef>
       </dsp:style>
       <dsp:txBody>
-        <a:bodyPr spcFirstLastPara="0" vert="horz" wrap="square" lIns="496262" tIns="163830" rIns="305816" bIns="163830" numCol="1" spcCol="1270" anchor="ctr" anchorCtr="0">
+        <a:bodyPr spcFirstLastPara="0" vert="horz" wrap="square" lIns="496262" tIns="201930" rIns="376936" bIns="201930" numCol="1" spcCol="1270" anchor="ctr" anchorCtr="0">
           <a:noAutofit/>
         </a:bodyPr>
         <a:lstStyle/>
         <a:p>
-          <a:pPr marL="0" lvl="0" indent="0" algn="ctr" defTabSz="1911350">
+          <a:pPr marL="0" lvl="0" indent="0" algn="ctr" defTabSz="2355850">
             <a:lnSpc>
               <a:spcPct val="90000"/>
             </a:lnSpc>
@@ -1243,10 +1244,10 @@
             <a:buNone/>
           </a:pPr>
           <a:r>
-            <a:rPr lang="en-US" sz="4300" kern="1200" dirty="0"/>
-            <a:t>Write your functions</a:t>
+            <a:rPr lang="en-US" sz="5300" kern="1200" dirty="0"/>
+            <a:t>Write</a:t>
           </a:r>
-          <a:endParaRPr lang="en-IL" sz="4300" kern="1200" dirty="0"/>
+          <a:endParaRPr lang="en-IL" sz="5300" kern="1200" dirty="0"/>
         </a:p>
       </dsp:txBody>
       <dsp:txXfrm rot="10800000">
@@ -1353,12 +1354,12 @@
         </a:fontRef>
       </dsp:style>
       <dsp:txBody>
-        <a:bodyPr spcFirstLastPara="0" vert="horz" wrap="square" lIns="496262" tIns="163830" rIns="305816" bIns="163830" numCol="1" spcCol="1270" anchor="ctr" anchorCtr="0">
+        <a:bodyPr spcFirstLastPara="0" vert="horz" wrap="square" lIns="496262" tIns="201930" rIns="376936" bIns="201930" numCol="1" spcCol="1270" anchor="ctr" anchorCtr="0">
           <a:noAutofit/>
         </a:bodyPr>
         <a:lstStyle/>
         <a:p>
-          <a:pPr marL="0" lvl="0" indent="0" algn="ctr" defTabSz="1911350">
+          <a:pPr marL="0" lvl="0" indent="0" algn="ctr" defTabSz="2355850">
             <a:lnSpc>
               <a:spcPct val="90000"/>
             </a:lnSpc>
@@ -1371,10 +1372,10 @@
             <a:buNone/>
           </a:pPr>
           <a:r>
-            <a:rPr lang="en-US" sz="4300" kern="1200"/>
-            <a:t>Decorate a little</a:t>
+            <a:rPr lang="en-US" sz="5300" kern="1200" dirty="0"/>
+            <a:t>Decorate</a:t>
           </a:r>
-          <a:endParaRPr lang="en-IL" sz="4300" kern="1200"/>
+          <a:endParaRPr lang="en-IL" sz="5300" kern="1200" dirty="0"/>
         </a:p>
       </dsp:txBody>
       <dsp:txXfrm rot="10800000">
@@ -1481,12 +1482,12 @@
         </a:fontRef>
       </dsp:style>
       <dsp:txBody>
-        <a:bodyPr spcFirstLastPara="0" vert="horz" wrap="square" lIns="496262" tIns="163830" rIns="305816" bIns="163830" numCol="1" spcCol="1270" anchor="ctr" anchorCtr="0">
+        <a:bodyPr spcFirstLastPara="0" vert="horz" wrap="square" lIns="496262" tIns="201930" rIns="376936" bIns="201930" numCol="1" spcCol="1270" anchor="ctr" anchorCtr="0">
           <a:noAutofit/>
         </a:bodyPr>
         <a:lstStyle/>
         <a:p>
-          <a:pPr marL="0" lvl="0" indent="0" algn="ctr" defTabSz="1911350">
+          <a:pPr marL="0" lvl="0" indent="0" algn="ctr" defTabSz="2355850">
             <a:lnSpc>
               <a:spcPct val="90000"/>
             </a:lnSpc>
@@ -1499,10 +1500,10 @@
             <a:buNone/>
           </a:pPr>
           <a:r>
-            <a:rPr lang="en-US" sz="4300" kern="1200"/>
-            <a:t>Push to the cloud</a:t>
+            <a:rPr lang="en-US" sz="5300" kern="1200" dirty="0"/>
+            <a:t>Deploy</a:t>
           </a:r>
-          <a:endParaRPr lang="en-IL" sz="4300" kern="1200"/>
+          <a:endParaRPr lang="en-IL" sz="5300" kern="1200" dirty="0"/>
         </a:p>
       </dsp:txBody>
       <dsp:txXfrm rot="10800000">
@@ -2842,7 +2843,7 @@
           <a:p>
             <a:fld id="{5C93CA8F-50F8-44B5-B48F-4C4452AC4FCB}" type="datetimeFigureOut">
               <a:rPr lang="he-IL" smtClean="0"/>
-              <a:t>י"ז/טבת/תש"פ</a:t>
+              <a:t>י"ח/טבת/תש"פ</a:t>
             </a:fld>
             <a:endParaRPr lang="he-IL"/>
           </a:p>
@@ -7439,6 +7440,509 @@
     <p:extLst>
       <p:ext uri="{BB962C8B-B14F-4D97-AF65-F5344CB8AC3E}">
         <p14:creationId xmlns:p14="http://schemas.microsoft.com/office/powerpoint/2010/main" val="2722187539"/>
+      </p:ext>
+    </p:extLst>
+  </p:cSld>
+  <p:clrMapOvr>
+    <a:masterClrMapping/>
+  </p:clrMapOvr>
+</p:sld>
+</file>
+
+<file path=ppt/slides/slide10.xml><?xml version="1.0" encoding="utf-8"?>
+<p:sld xmlns:a="http://schemas.openxmlformats.org/drawingml/2006/main" xmlns:r="http://schemas.openxmlformats.org/officeDocument/2006/relationships" xmlns:p="http://schemas.openxmlformats.org/presentationml/2006/main">
+  <p:cSld>
+    <p:spTree>
+      <p:nvGrpSpPr>
+        <p:cNvPr id="1" name=""/>
+        <p:cNvGrpSpPr/>
+        <p:nvPr/>
+      </p:nvGrpSpPr>
+      <p:grpSpPr>
+        <a:xfrm>
+          <a:off x="0" y="0"/>
+          <a:ext cx="0" cy="0"/>
+          <a:chOff x="0" y="0"/>
+          <a:chExt cx="0" cy="0"/>
+        </a:xfrm>
+      </p:grpSpPr>
+      <p:sp>
+        <p:nvSpPr>
+          <p:cNvPr id="2" name="Title 1"/>
+          <p:cNvSpPr>
+            <a:spLocks noGrp="1"/>
+          </p:cNvSpPr>
+          <p:nvPr>
+            <p:ph type="title"/>
+          </p:nvPr>
+        </p:nvSpPr>
+        <p:spPr>
+          <a:xfrm>
+            <a:off x="2167128" y="1110995"/>
+            <a:ext cx="9281160" cy="3520440"/>
+          </a:xfrm>
+        </p:spPr>
+        <p:txBody>
+          <a:bodyPr>
+            <a:normAutofit/>
+          </a:bodyPr>
+          <a:lstStyle/>
+          <a:p>
+            <a:pPr>
+              <a:lnSpc>
+                <a:spcPct val="100000"/>
+              </a:lnSpc>
+            </a:pPr>
+            <a:r>
+              <a:rPr lang="en-US" sz="5400" dirty="0"/>
+              <a:t>Thanks!</a:t>
+            </a:r>
+            <a:br>
+              <a:rPr lang="en-US" sz="5400" dirty="0"/>
+            </a:br>
+            <a:r>
+              <a:rPr lang="en-US" sz="3200" dirty="0"/>
+              <a:t>(Almost) Everything is here:</a:t>
+            </a:r>
+            <a:br>
+              <a:rPr lang="en-US" sz="3200" dirty="0"/>
+            </a:br>
+            <a:r>
+              <a:rPr lang="en-US" sz="2400" dirty="0">
+                <a:hlinkClick r:id="rId2"/>
+              </a:rPr>
+              <a:t>https://github.com/adisarid/startrek_plumber_api</a:t>
+            </a:r>
+            <a:endParaRPr lang="he-IL" dirty="0"/>
+          </a:p>
+        </p:txBody>
+      </p:sp>
+      <p:sp>
+        <p:nvSpPr>
+          <p:cNvPr id="3" name="Content Placeholder 2"/>
+          <p:cNvSpPr>
+            <a:spLocks noGrp="1"/>
+          </p:cNvSpPr>
+          <p:nvPr>
+            <p:ph type="body" idx="1"/>
+          </p:nvPr>
+        </p:nvSpPr>
+        <p:spPr>
+          <a:xfrm>
+            <a:off x="2165774" y="5013819"/>
+            <a:ext cx="3015826" cy="1066800"/>
+          </a:xfrm>
+        </p:spPr>
+        <p:txBody>
+          <a:bodyPr>
+            <a:normAutofit fontScale="85000" lnSpcReduction="20000"/>
+          </a:bodyPr>
+          <a:lstStyle/>
+          <a:p>
+            <a:r>
+              <a:rPr lang="en-US" dirty="0"/>
+              <a:t>Adi Sarid</a:t>
+            </a:r>
+          </a:p>
+          <a:p>
+            <a:r>
+              <a:rPr lang="en-US" dirty="0">
+                <a:hlinkClick r:id="rId3"/>
+              </a:rPr>
+              <a:t>adi@sarid-ins.co.il</a:t>
+            </a:r>
+            <a:endParaRPr lang="en-US" dirty="0"/>
+          </a:p>
+          <a:p>
+            <a:r>
+              <a:rPr lang="en-US" dirty="0">
+                <a:hlinkClick r:id="rId4"/>
+              </a:rPr>
+              <a:t>@</a:t>
+            </a:r>
+            <a:r>
+              <a:rPr lang="en-US" dirty="0" err="1">
+                <a:hlinkClick r:id="rId4"/>
+              </a:rPr>
+              <a:t>SaridResearch</a:t>
+            </a:r>
+            <a:endParaRPr lang="en-US" dirty="0"/>
+          </a:p>
+        </p:txBody>
+      </p:sp>
+      <p:sp>
+        <p:nvSpPr>
+          <p:cNvPr id="4" name="Footer Placeholder 3"/>
+          <p:cNvSpPr>
+            <a:spLocks noGrp="1"/>
+          </p:cNvSpPr>
+          <p:nvPr>
+            <p:ph type="ftr" sz="quarter" idx="11"/>
+          </p:nvPr>
+        </p:nvSpPr>
+        <p:spPr/>
+        <p:txBody>
+          <a:bodyPr/>
+          <a:lstStyle/>
+          <a:p>
+            <a:r>
+              <a:rPr lang="en-US"/>
+              <a:t>Materials by Adi Sarid https://adisarid.github.io and http://www.sarid-ins.com</a:t>
+            </a:r>
+            <a:endParaRPr lang="en-US" dirty="0"/>
+          </a:p>
+        </p:txBody>
+      </p:sp>
+      <p:sp>
+        <p:nvSpPr>
+          <p:cNvPr id="5" name="Slide Number Placeholder 4"/>
+          <p:cNvSpPr>
+            <a:spLocks noGrp="1"/>
+          </p:cNvSpPr>
+          <p:nvPr>
+            <p:ph type="sldNum" sz="quarter" idx="12"/>
+          </p:nvPr>
+        </p:nvSpPr>
+        <p:spPr/>
+        <p:txBody>
+          <a:bodyPr/>
+          <a:lstStyle/>
+          <a:p>
+            <a:fld id="{4FAB73BC-B049-4115-A692-8D63A059BFB8}" type="slidenum">
+              <a:rPr lang="en-US" smtClean="0"/>
+              <a:t>10</a:t>
+            </a:fld>
+            <a:endParaRPr lang="en-US" dirty="0"/>
+          </a:p>
+        </p:txBody>
+      </p:sp>
+      <p:sp>
+        <p:nvSpPr>
+          <p:cNvPr id="6" name="Content Placeholder 2">
+            <a:extLst>
+              <a:ext uri="{FF2B5EF4-FFF2-40B4-BE49-F238E27FC236}">
+                <a16:creationId xmlns:a16="http://schemas.microsoft.com/office/drawing/2014/main" id="{B0537197-6106-4C67-80A8-238C92497769}"/>
+              </a:ext>
+            </a:extLst>
+          </p:cNvPr>
+          <p:cNvSpPr txBox="1">
+            <a:spLocks/>
+          </p:cNvSpPr>
+          <p:nvPr/>
+        </p:nvSpPr>
+        <p:spPr>
+          <a:xfrm>
+            <a:off x="5605670" y="5013819"/>
+            <a:ext cx="3984531" cy="899619"/>
+          </a:xfrm>
+          <a:prstGeom prst="rect">
+            <a:avLst/>
+          </a:prstGeom>
+        </p:spPr>
+        <p:txBody>
+          <a:bodyPr vert="horz" lIns="91440" tIns="45720" rIns="91440" bIns="45720" rtlCol="0" anchor="t">
+            <a:normAutofit/>
+          </a:bodyPr>
+          <a:lstStyle>
+            <a:lvl1pPr indent="0" defTabSz="914400">
+              <a:lnSpc>
+                <a:spcPct val="90000"/>
+              </a:lnSpc>
+              <a:spcBef>
+                <a:spcPts val="1200"/>
+              </a:spcBef>
+              <a:buClr>
+                <a:schemeClr val="accent2"/>
+              </a:buClr>
+              <a:buSzPct val="85000"/>
+              <a:buFont typeface="Wingdings" pitchFamily="2" charset="2"/>
+              <a:buNone/>
+              <a:defRPr sz="2000" b="1">
+                <a:solidFill>
+                  <a:schemeClr val="accent2">
+                    <a:lumMod val="50000"/>
+                  </a:schemeClr>
+                </a:solidFill>
+              </a:defRPr>
+            </a:lvl1pPr>
+            <a:lvl2pPr indent="0" defTabSz="914400">
+              <a:lnSpc>
+                <a:spcPct val="90000"/>
+              </a:lnSpc>
+              <a:spcBef>
+                <a:spcPts val="400"/>
+              </a:spcBef>
+              <a:spcAft>
+                <a:spcPts val="200"/>
+              </a:spcAft>
+              <a:buClr>
+                <a:schemeClr val="accent2"/>
+              </a:buClr>
+              <a:buSzPct val="85000"/>
+              <a:buFont typeface="Wingdings" pitchFamily="2" charset="2"/>
+              <a:buNone/>
+              <a:defRPr>
+                <a:solidFill>
+                  <a:schemeClr val="tx1">
+                    <a:tint val="75000"/>
+                  </a:schemeClr>
+                </a:solidFill>
+              </a:defRPr>
+            </a:lvl2pPr>
+            <a:lvl3pPr indent="0" defTabSz="914400">
+              <a:lnSpc>
+                <a:spcPct val="90000"/>
+              </a:lnSpc>
+              <a:spcBef>
+                <a:spcPts val="400"/>
+              </a:spcBef>
+              <a:spcAft>
+                <a:spcPts val="200"/>
+              </a:spcAft>
+              <a:buClr>
+                <a:schemeClr val="accent2"/>
+              </a:buClr>
+              <a:buSzPct val="85000"/>
+              <a:buFont typeface="Wingdings" pitchFamily="2" charset="2"/>
+              <a:buNone/>
+              <a:defRPr sz="1600">
+                <a:solidFill>
+                  <a:schemeClr val="tx1">
+                    <a:tint val="75000"/>
+                  </a:schemeClr>
+                </a:solidFill>
+              </a:defRPr>
+            </a:lvl3pPr>
+            <a:lvl4pPr indent="0" defTabSz="914400">
+              <a:lnSpc>
+                <a:spcPct val="90000"/>
+              </a:lnSpc>
+              <a:spcBef>
+                <a:spcPts val="400"/>
+              </a:spcBef>
+              <a:spcAft>
+                <a:spcPts val="200"/>
+              </a:spcAft>
+              <a:buClr>
+                <a:schemeClr val="accent2"/>
+              </a:buClr>
+              <a:buSzPct val="85000"/>
+              <a:buFont typeface="Wingdings" pitchFamily="2" charset="2"/>
+              <a:buNone/>
+              <a:defRPr sz="1400">
+                <a:solidFill>
+                  <a:schemeClr val="tx1">
+                    <a:tint val="75000"/>
+                  </a:schemeClr>
+                </a:solidFill>
+              </a:defRPr>
+            </a:lvl4pPr>
+            <a:lvl5pPr indent="0" defTabSz="914400">
+              <a:lnSpc>
+                <a:spcPct val="90000"/>
+              </a:lnSpc>
+              <a:spcBef>
+                <a:spcPts val="400"/>
+              </a:spcBef>
+              <a:spcAft>
+                <a:spcPts val="200"/>
+              </a:spcAft>
+              <a:buClr>
+                <a:schemeClr val="accent2"/>
+              </a:buClr>
+              <a:buSzPct val="85000"/>
+              <a:buFont typeface="Wingdings" pitchFamily="2" charset="2"/>
+              <a:buNone/>
+              <a:defRPr sz="1400">
+                <a:solidFill>
+                  <a:schemeClr val="tx1">
+                    <a:tint val="75000"/>
+                  </a:schemeClr>
+                </a:solidFill>
+              </a:defRPr>
+            </a:lvl5pPr>
+            <a:lvl6pPr indent="0" algn="r" defTabSz="914400" rtl="1">
+              <a:lnSpc>
+                <a:spcPct val="90000"/>
+              </a:lnSpc>
+              <a:spcBef>
+                <a:spcPts val="400"/>
+              </a:spcBef>
+              <a:spcAft>
+                <a:spcPts val="200"/>
+              </a:spcAft>
+              <a:buClr>
+                <a:schemeClr val="accent2"/>
+              </a:buClr>
+              <a:buSzPct val="85000"/>
+              <a:buFont typeface="Wingdings" pitchFamily="2" charset="2"/>
+              <a:buNone/>
+              <a:defRPr sz="1400">
+                <a:solidFill>
+                  <a:schemeClr val="tx1">
+                    <a:tint val="75000"/>
+                  </a:schemeClr>
+                </a:solidFill>
+              </a:defRPr>
+            </a:lvl6pPr>
+            <a:lvl7pPr indent="0" algn="r" defTabSz="914400" rtl="1">
+              <a:lnSpc>
+                <a:spcPct val="90000"/>
+              </a:lnSpc>
+              <a:spcBef>
+                <a:spcPts val="400"/>
+              </a:spcBef>
+              <a:spcAft>
+                <a:spcPts val="200"/>
+              </a:spcAft>
+              <a:buClr>
+                <a:schemeClr val="accent2"/>
+              </a:buClr>
+              <a:buSzPct val="85000"/>
+              <a:buFont typeface="Wingdings" pitchFamily="2" charset="2"/>
+              <a:buNone/>
+              <a:defRPr sz="1400">
+                <a:solidFill>
+                  <a:schemeClr val="tx1">
+                    <a:tint val="75000"/>
+                  </a:schemeClr>
+                </a:solidFill>
+              </a:defRPr>
+            </a:lvl7pPr>
+            <a:lvl8pPr indent="0" algn="r" defTabSz="914400" rtl="1">
+              <a:lnSpc>
+                <a:spcPct val="90000"/>
+              </a:lnSpc>
+              <a:spcBef>
+                <a:spcPts val="400"/>
+              </a:spcBef>
+              <a:spcAft>
+                <a:spcPts val="200"/>
+              </a:spcAft>
+              <a:buClr>
+                <a:schemeClr val="accent2"/>
+              </a:buClr>
+              <a:buSzPct val="85000"/>
+              <a:buFont typeface="Wingdings" pitchFamily="2" charset="2"/>
+              <a:buNone/>
+              <a:defRPr sz="1400">
+                <a:solidFill>
+                  <a:schemeClr val="tx1">
+                    <a:tint val="75000"/>
+                  </a:schemeClr>
+                </a:solidFill>
+              </a:defRPr>
+            </a:lvl8pPr>
+            <a:lvl9pPr indent="0" algn="r" defTabSz="914400" rtl="1">
+              <a:lnSpc>
+                <a:spcPct val="90000"/>
+              </a:lnSpc>
+              <a:spcBef>
+                <a:spcPts val="400"/>
+              </a:spcBef>
+              <a:spcAft>
+                <a:spcPts val="200"/>
+              </a:spcAft>
+              <a:buClr>
+                <a:schemeClr val="accent2"/>
+              </a:buClr>
+              <a:buSzPct val="85000"/>
+              <a:buFont typeface="Wingdings" pitchFamily="2" charset="2"/>
+              <a:buNone/>
+              <a:defRPr sz="1400">
+                <a:solidFill>
+                  <a:schemeClr val="tx1">
+                    <a:tint val="75000"/>
+                  </a:schemeClr>
+                </a:solidFill>
+              </a:defRPr>
+            </a:lvl9pPr>
+          </a:lstStyle>
+          <a:p>
+            <a:r>
+              <a:rPr lang="en-US" dirty="0"/>
+              <a:t>https://www.sarid-ins.co.il</a:t>
+            </a:r>
+          </a:p>
+          <a:p>
+            <a:r>
+              <a:rPr lang="en-US" dirty="0"/>
+              <a:t>https://adisarid.github.io</a:t>
+            </a:r>
+            <a:endParaRPr lang="he-IL" dirty="0"/>
+          </a:p>
+        </p:txBody>
+      </p:sp>
+      <p:pic>
+        <p:nvPicPr>
+          <p:cNvPr id="7" name="Picture 6">
+            <a:extLst>
+              <a:ext uri="{FF2B5EF4-FFF2-40B4-BE49-F238E27FC236}">
+                <a16:creationId xmlns:a16="http://schemas.microsoft.com/office/drawing/2014/main" id="{7F157C0F-3423-4895-9D7B-44877F171C54}"/>
+              </a:ext>
+            </a:extLst>
+          </p:cNvPr>
+          <p:cNvPicPr>
+            <a:picLocks noChangeAspect="1"/>
+          </p:cNvPicPr>
+          <p:nvPr/>
+        </p:nvPicPr>
+        <p:blipFill>
+          <a:blip r:embed="rId5">
+            <a:extLst>
+              <a:ext uri="{28A0092B-C50C-407E-A947-70E740481C1C}">
+                <a14:useLocalDpi xmlns:a14="http://schemas.microsoft.com/office/drawing/2010/main" val="0"/>
+              </a:ext>
+            </a:extLst>
+          </a:blip>
+          <a:stretch>
+            <a:fillRect/>
+          </a:stretch>
+        </p:blipFill>
+        <p:spPr>
+          <a:xfrm>
+            <a:off x="9826149" y="303698"/>
+            <a:ext cx="2089730" cy="849826"/>
+          </a:xfrm>
+          <a:prstGeom prst="rect">
+            <a:avLst/>
+          </a:prstGeom>
+        </p:spPr>
+      </p:pic>
+      <p:pic>
+        <p:nvPicPr>
+          <p:cNvPr id="9" name="Picture 8" descr="A picture containing plant&#10;&#10;Description automatically generated">
+            <a:extLst>
+              <a:ext uri="{FF2B5EF4-FFF2-40B4-BE49-F238E27FC236}">
+                <a16:creationId xmlns:a16="http://schemas.microsoft.com/office/drawing/2014/main" id="{DB0DF64B-229B-4100-9336-BBBFFE41BECC}"/>
+              </a:ext>
+            </a:extLst>
+          </p:cNvPr>
+          <p:cNvPicPr>
+            <a:picLocks noChangeAspect="1"/>
+          </p:cNvPicPr>
+          <p:nvPr/>
+        </p:nvPicPr>
+        <p:blipFill>
+          <a:blip r:embed="rId6"/>
+          <a:stretch>
+            <a:fillRect/>
+          </a:stretch>
+        </p:blipFill>
+        <p:spPr>
+          <a:xfrm>
+            <a:off x="1638176" y="5583207"/>
+            <a:ext cx="585216" cy="585216"/>
+          </a:xfrm>
+          <a:prstGeom prst="rect">
+            <a:avLst/>
+          </a:prstGeom>
+        </p:spPr>
+      </p:pic>
+    </p:spTree>
+    <p:extLst>
+      <p:ext uri="{BB962C8B-B14F-4D97-AF65-F5344CB8AC3E}">
+        <p14:creationId xmlns:p14="http://schemas.microsoft.com/office/powerpoint/2010/main" val="2362242755"/>
       </p:ext>
     </p:extLst>
   </p:cSld>
@@ -9217,7 +9721,7 @@
             <p:ph idx="1"/>
             <p:extLst>
               <p:ext uri="{D42A27DB-BD31-4B8C-83A1-F6EECF244321}">
-                <p14:modId xmlns:p14="http://schemas.microsoft.com/office/powerpoint/2010/main" val="2788287362"/>
+                <p14:modId xmlns:p14="http://schemas.microsoft.com/office/powerpoint/2010/main" val="779932849"/>
               </p:ext>
             </p:extLst>
           </p:nvPr>
@@ -9657,8 +10161,8 @@
         </p:nvSpPr>
         <p:spPr>
           <a:xfrm>
-            <a:off x="8192755" y="3825822"/>
-            <a:ext cx="2612572" cy="369332"/>
+            <a:off x="7445827" y="2511897"/>
+            <a:ext cx="4531806" cy="3323987"/>
           </a:xfrm>
           <a:prstGeom prst="rect">
             <a:avLst/>
@@ -9672,14 +10176,127 @@
           <a:lstStyle/>
           <a:p>
             <a:r>
-              <a:rPr lang="en-US" dirty="0"/>
-              <a:t>/R/</a:t>
-            </a:r>
-            <a:r>
-              <a:rPr lang="en-US" dirty="0" err="1"/>
+              <a:rPr lang="en-US" sz="1400" dirty="0"/>
+              <a:t>Code:</a:t>
+            </a:r>
+          </a:p>
+          <a:p>
+            <a:r>
+              <a:rPr lang="en-US" sz="1400" dirty="0"/>
+              <a:t>R/</a:t>
+            </a:r>
+            <a:r>
+              <a:rPr lang="en-US" sz="1400" dirty="0" err="1"/>
+              <a:t>get_startrek_quote.R</a:t>
+            </a:r>
+            <a:endParaRPr lang="en-US" sz="1400" dirty="0"/>
+          </a:p>
+          <a:p>
+            <a:r>
+              <a:rPr lang="en-US" sz="1400" dirty="0"/>
+              <a:t>./</a:t>
+            </a:r>
+            <a:r>
+              <a:rPr lang="en-US" sz="1400" dirty="0" err="1"/>
               <a:t>plumber.R</a:t>
             </a:r>
-            <a:endParaRPr lang="en-IL" dirty="0"/>
+            <a:endParaRPr lang="en-US" sz="1400" dirty="0"/>
+          </a:p>
+          <a:p>
+            <a:endParaRPr lang="en-US" sz="1400" dirty="0"/>
+          </a:p>
+          <a:p>
+            <a:r>
+              <a:rPr lang="en-US" sz="1400" dirty="0"/>
+              <a:t>Example online (just for today):</a:t>
+            </a:r>
+          </a:p>
+          <a:p>
+            <a:r>
+              <a:rPr lang="en-US" sz="1400" dirty="0">
+                <a:hlinkClick r:id="rId3"/>
+              </a:rPr>
+              <a:t>api.hebrewr.co.il:8000/__swagger__</a:t>
+            </a:r>
+            <a:endParaRPr lang="en-US" sz="1400" dirty="0"/>
+          </a:p>
+          <a:p>
+            <a:endParaRPr lang="en-US" sz="1400" dirty="0"/>
+          </a:p>
+          <a:p>
+            <a:r>
+              <a:rPr lang="en-US" sz="1400" dirty="0">
+                <a:hlinkClick r:id="rId4"/>
+              </a:rPr>
+              <a:t>api.hebrewr.co.il:8000/</a:t>
+            </a:r>
+            <a:r>
+              <a:rPr lang="en-US" sz="1400" dirty="0" err="1">
+                <a:hlinkClick r:id="rId4"/>
+              </a:rPr>
+              <a:t>startrekquote?character_fl</a:t>
+            </a:r>
+            <a:r>
+              <a:rPr lang="en-US" sz="1400" dirty="0">
+                <a:hlinkClick r:id="rId4"/>
+              </a:rPr>
+              <a:t>=WORF</a:t>
+            </a:r>
+            <a:endParaRPr lang="en-US" sz="1400" dirty="0"/>
+          </a:p>
+          <a:p>
+            <a:endParaRPr lang="en-US" sz="1400" dirty="0"/>
+          </a:p>
+          <a:p>
+            <a:r>
+              <a:rPr lang="en-US" sz="1400" dirty="0">
+                <a:hlinkClick r:id="rId5"/>
+              </a:rPr>
+              <a:t>api.hebrewr.co.il:8000/</a:t>
+            </a:r>
+            <a:r>
+              <a:rPr lang="en-US" sz="1400" dirty="0" err="1">
+                <a:hlinkClick r:id="rId5"/>
+              </a:rPr>
+              <a:t>startrekquote?series_fl</a:t>
+            </a:r>
+            <a:r>
+              <a:rPr lang="en-US" sz="1400" dirty="0">
+                <a:hlinkClick r:id="rId5"/>
+              </a:rPr>
+              <a:t>=VOY</a:t>
+            </a:r>
+            <a:endParaRPr lang="en-US" sz="1400" dirty="0"/>
+          </a:p>
+          <a:p>
+            <a:endParaRPr lang="en-US" sz="1400" dirty="0"/>
+          </a:p>
+          <a:p>
+            <a:r>
+              <a:rPr lang="en-US" sz="1400" dirty="0">
+                <a:hlinkClick r:id="rId6"/>
+              </a:rPr>
+              <a:t>api.hebrewr.co.il:8000/</a:t>
+            </a:r>
+            <a:r>
+              <a:rPr lang="en-US" sz="1400" dirty="0" err="1">
+                <a:hlinkClick r:id="rId6"/>
+              </a:rPr>
+              <a:t>startrekquote?character_fl</a:t>
+            </a:r>
+            <a:r>
+              <a:rPr lang="en-US" sz="1400" dirty="0">
+                <a:hlinkClick r:id="rId6"/>
+              </a:rPr>
+              <a:t>=</a:t>
+            </a:r>
+            <a:r>
+              <a:rPr lang="en-US" sz="1400" dirty="0" err="1">
+                <a:hlinkClick r:id="rId6"/>
+              </a:rPr>
+              <a:t>skywalker</a:t>
+            </a:r>
+            <a:endParaRPr lang="en-IL" sz="1400" dirty="0"/>
           </a:p>
         </p:txBody>
       </p:sp>
@@ -9718,7 +10335,7 @@
           <p:cNvPr id="2" name="Title 1">
             <a:extLst>
               <a:ext uri="{FF2B5EF4-FFF2-40B4-BE49-F238E27FC236}">
-                <a16:creationId xmlns:a16="http://schemas.microsoft.com/office/drawing/2014/main" id="{06FAD188-81E2-42B4-8532-A50346F1B059}"/>
+                <a16:creationId xmlns:a16="http://schemas.microsoft.com/office/drawing/2014/main" id="{8832C444-C7D4-4FBC-B124-FE3A31177A68}"/>
               </a:ext>
             </a:extLst>
           </p:cNvPr>
@@ -9736,7 +10353,7 @@
           <a:p>
             <a:r>
               <a:rPr lang="en-US" dirty="0"/>
-              <a:t>Some related resources</a:t>
+              <a:t>To Summarize</a:t>
             </a:r>
             <a:endParaRPr lang="en-IL" dirty="0"/>
           </a:p>
@@ -9747,7 +10364,7 @@
           <p:cNvPr id="3" name="Content Placeholder 2">
             <a:extLst>
               <a:ext uri="{FF2B5EF4-FFF2-40B4-BE49-F238E27FC236}">
-                <a16:creationId xmlns:a16="http://schemas.microsoft.com/office/drawing/2014/main" id="{306FC31E-BCEC-457A-AD98-3C82FA6F713F}"/>
+                <a16:creationId xmlns:a16="http://schemas.microsoft.com/office/drawing/2014/main" id="{1DBC5157-6E07-4BD8-BC11-06F9FB6DAC5B}"/>
               </a:ext>
             </a:extLst>
           </p:cNvPr>
@@ -9760,59 +10377,61 @@
         </p:nvSpPr>
         <p:spPr/>
         <p:txBody>
-          <a:bodyPr>
-            <a:normAutofit/>
-          </a:bodyPr>
+          <a:bodyPr/>
           <a:lstStyle/>
           <a:p>
-            <a:pPr>
-              <a:lnSpc>
-                <a:spcPct val="150000"/>
-              </a:lnSpc>
-            </a:pPr>
             <a:r>
               <a:rPr lang="en-US" dirty="0"/>
-              <a:t>This presentation and all the live-coding are available</a:t>
-            </a:r>
-          </a:p>
-          <a:p>
-            <a:pPr lvl="1">
-              <a:lnSpc>
-                <a:spcPct val="150000"/>
-              </a:lnSpc>
-            </a:pPr>
+              <a:t>RESTful APIs are extremely powerful!</a:t>
+            </a:r>
+          </a:p>
+          <a:p>
+            <a:r>
+              <a:rPr lang="en-US" dirty="0"/>
+              <a:t>It’s worthwhile to know how to use RESTful APIs to access other services from within R (i.e., package </a:t>
+            </a:r>
+            <a:r>
+              <a:rPr lang="en-US" dirty="0" err="1">
+                <a:latin typeface="Courier New" panose="02070309020205020404" pitchFamily="49" charset="0"/>
+                <a:cs typeface="Courier New" panose="02070309020205020404" pitchFamily="49" charset="0"/>
+              </a:rPr>
+              <a:t>httr</a:t>
+            </a:r>
+            <a:r>
+              <a:rPr lang="en-US" dirty="0"/>
+              <a:t>, </a:t>
+            </a:r>
+            <a:r>
+              <a:rPr lang="en-US" dirty="0" err="1">
+                <a:latin typeface="Courier New" panose="02070309020205020404" pitchFamily="49" charset="0"/>
+                <a:cs typeface="Courier New" panose="02070309020205020404" pitchFamily="49" charset="0"/>
+              </a:rPr>
+              <a:t>jsonlite</a:t>
+            </a:r>
+            <a:r>
+              <a:rPr lang="en-US" dirty="0"/>
+              <a:t>, etc.)</a:t>
+            </a:r>
+          </a:p>
+          <a:p>
+            <a:r>
+              <a:rPr lang="en-US" dirty="0"/>
+              <a:t>When you need to expose or integrate your code/models to other developers, you might want to consider building an API of your own using </a:t>
+            </a:r>
             <a:r>
               <a:rPr lang="en-US" dirty="0">
-                <a:hlinkClick r:id="rId2"/>
+                <a:latin typeface="Courier New" panose="02070309020205020404" pitchFamily="49" charset="0"/>
+                <a:cs typeface="Courier New" panose="02070309020205020404" pitchFamily="49" charset="0"/>
               </a:rPr>
-              <a:t>https://github.com/adisarid/startrek_plumber_api</a:t>
-            </a:r>
-            <a:endParaRPr lang="en-US" dirty="0"/>
-          </a:p>
-          <a:p>
-            <a:pPr>
-              <a:lnSpc>
-                <a:spcPct val="150000"/>
-              </a:lnSpc>
-            </a:pPr>
+              <a:t>plumber</a:t>
+            </a:r>
+          </a:p>
+          <a:p>
             <a:r>
               <a:rPr lang="en-US" dirty="0"/>
-              <a:t>The plumber package official documentation</a:t>
-            </a:r>
-          </a:p>
-          <a:p>
-            <a:pPr lvl="1">
-              <a:lnSpc>
-                <a:spcPct val="150000"/>
-              </a:lnSpc>
-            </a:pPr>
-            <a:r>
-              <a:rPr lang="en-US" dirty="0">
-                <a:hlinkClick r:id="rId3"/>
-              </a:rPr>
-              <a:t>https://www.rplumber.io/</a:t>
-            </a:r>
-            <a:endParaRPr lang="en-US" dirty="0"/>
+              <a:t>This can also be useful for automation of your internal processes</a:t>
+            </a:r>
+            <a:endParaRPr lang="en-IL" dirty="0"/>
           </a:p>
         </p:txBody>
       </p:sp>
@@ -9821,7 +10440,7 @@
           <p:cNvPr id="4" name="Footer Placeholder 3">
             <a:extLst>
               <a:ext uri="{FF2B5EF4-FFF2-40B4-BE49-F238E27FC236}">
-                <a16:creationId xmlns:a16="http://schemas.microsoft.com/office/drawing/2014/main" id="{06D2CDA7-0FCD-4542-B1C5-BD9AE2C81672}"/>
+                <a16:creationId xmlns:a16="http://schemas.microsoft.com/office/drawing/2014/main" id="{F52D8B8A-4D4C-4EAF-A463-0E988EEA4629}"/>
               </a:ext>
             </a:extLst>
           </p:cNvPr>
@@ -9850,7 +10469,7 @@
           <p:cNvPr id="5" name="Slide Number Placeholder 4">
             <a:extLst>
               <a:ext uri="{FF2B5EF4-FFF2-40B4-BE49-F238E27FC236}">
-                <a16:creationId xmlns:a16="http://schemas.microsoft.com/office/drawing/2014/main" id="{B59DF997-52E5-4654-942F-75FF8BE9C625}"/>
+                <a16:creationId xmlns:a16="http://schemas.microsoft.com/office/drawing/2014/main" id="{403E7E8A-4C71-47ED-8278-0C9699C7160D}"/>
               </a:ext>
             </a:extLst>
           </p:cNvPr>
@@ -9877,7 +10496,7 @@
     </p:spTree>
     <p:extLst>
       <p:ext uri="{BB962C8B-B14F-4D97-AF65-F5344CB8AC3E}">
-        <p14:creationId xmlns:p14="http://schemas.microsoft.com/office/powerpoint/2010/main" val="2169577064"/>
+        <p14:creationId xmlns:p14="http://schemas.microsoft.com/office/powerpoint/2010/main" val="354938250"/>
       </p:ext>
     </p:extLst>
   </p:cSld>
@@ -9906,7 +10525,13 @@
       </p:grpSpPr>
       <p:sp>
         <p:nvSpPr>
-          <p:cNvPr id="2" name="Title 1"/>
+          <p:cNvPr id="2" name="Title 1">
+            <a:extLst>
+              <a:ext uri="{FF2B5EF4-FFF2-40B4-BE49-F238E27FC236}">
+                <a16:creationId xmlns:a16="http://schemas.microsoft.com/office/drawing/2014/main" id="{06FAD188-81E2-42B4-8532-A50346F1B059}"/>
+              </a:ext>
+            </a:extLst>
+          </p:cNvPr>
           <p:cNvSpPr>
             <a:spLocks noGrp="1"/>
           </p:cNvSpPr>
@@ -9914,12 +10539,36 @@
             <p:ph type="title"/>
           </p:nvPr>
         </p:nvSpPr>
-        <p:spPr>
-          <a:xfrm>
-            <a:off x="2167128" y="1110995"/>
-            <a:ext cx="9281160" cy="3520440"/>
-          </a:xfrm>
-        </p:spPr>
+        <p:spPr/>
+        <p:txBody>
+          <a:bodyPr/>
+          <a:lstStyle/>
+          <a:p>
+            <a:r>
+              <a:rPr lang="en-US" dirty="0"/>
+              <a:t>Some related resources</a:t>
+            </a:r>
+            <a:endParaRPr lang="en-IL" dirty="0"/>
+          </a:p>
+        </p:txBody>
+      </p:sp>
+      <p:sp>
+        <p:nvSpPr>
+          <p:cNvPr id="3" name="Content Placeholder 2">
+            <a:extLst>
+              <a:ext uri="{FF2B5EF4-FFF2-40B4-BE49-F238E27FC236}">
+                <a16:creationId xmlns:a16="http://schemas.microsoft.com/office/drawing/2014/main" id="{306FC31E-BCEC-457A-AD98-3C82FA6F713F}"/>
+              </a:ext>
+            </a:extLst>
+          </p:cNvPr>
+          <p:cNvSpPr>
+            <a:spLocks noGrp="1"/>
+          </p:cNvSpPr>
+          <p:nvPr>
+            <p:ph idx="1"/>
+          </p:nvPr>
+        </p:nvSpPr>
+        <p:spPr/>
         <p:txBody>
           <a:bodyPr>
             <a:normAutofit/>
@@ -9928,89 +10577,64 @@
           <a:p>
             <a:pPr>
               <a:lnSpc>
-                <a:spcPct val="100000"/>
+                <a:spcPct val="150000"/>
               </a:lnSpc>
             </a:pPr>
             <a:r>
-              <a:rPr lang="en-US" sz="5400" dirty="0"/>
-              <a:t>Thanks!</a:t>
-            </a:r>
-            <a:br>
-              <a:rPr lang="en-US" sz="5400" dirty="0"/>
-            </a:br>
-            <a:r>
-              <a:rPr lang="en-US" sz="3200" dirty="0"/>
-              <a:t>(Almost) Everything is here:</a:t>
-            </a:r>
-            <a:br>
-              <a:rPr lang="en-US" sz="3200" dirty="0"/>
-            </a:br>
-            <a:r>
-              <a:rPr lang="en-US" sz="2400" dirty="0">
+              <a:rPr lang="en-US" dirty="0"/>
+              <a:t>This presentation and all the live-coding are available</a:t>
+            </a:r>
+          </a:p>
+          <a:p>
+            <a:pPr lvl="1">
+              <a:lnSpc>
+                <a:spcPct val="150000"/>
+              </a:lnSpc>
+            </a:pPr>
+            <a:r>
+              <a:rPr lang="en-US" dirty="0">
                 <a:hlinkClick r:id="rId2"/>
               </a:rPr>
               <a:t>https://github.com/adisarid/startrek_plumber_api</a:t>
             </a:r>
-            <a:endParaRPr lang="he-IL" dirty="0"/>
-          </a:p>
-        </p:txBody>
-      </p:sp>
-      <p:sp>
-        <p:nvSpPr>
-          <p:cNvPr id="3" name="Content Placeholder 2"/>
-          <p:cNvSpPr>
-            <a:spLocks noGrp="1"/>
-          </p:cNvSpPr>
-          <p:nvPr>
-            <p:ph type="body" idx="1"/>
-          </p:nvPr>
-        </p:nvSpPr>
-        <p:spPr>
-          <a:xfrm>
-            <a:off x="2165774" y="5013819"/>
-            <a:ext cx="3015826" cy="1066800"/>
-          </a:xfrm>
-        </p:spPr>
-        <p:txBody>
-          <a:bodyPr>
-            <a:normAutofit fontScale="85000" lnSpcReduction="20000"/>
-          </a:bodyPr>
-          <a:lstStyle/>
-          <a:p>
+            <a:endParaRPr lang="en-US" dirty="0"/>
+          </a:p>
+          <a:p>
+            <a:pPr>
+              <a:lnSpc>
+                <a:spcPct val="150000"/>
+              </a:lnSpc>
+            </a:pPr>
             <a:r>
               <a:rPr lang="en-US" dirty="0"/>
-              <a:t>Adi Sarid</a:t>
-            </a:r>
-          </a:p>
-          <a:p>
+              <a:t>The plumber package official documentation</a:t>
+            </a:r>
+          </a:p>
+          <a:p>
+            <a:pPr lvl="1">
+              <a:lnSpc>
+                <a:spcPct val="150000"/>
+              </a:lnSpc>
+            </a:pPr>
             <a:r>
               <a:rPr lang="en-US" dirty="0">
                 <a:hlinkClick r:id="rId3"/>
               </a:rPr>
-              <a:t>adi@sarid-ins.co.il</a:t>
+              <a:t>https://www.rplumber.io/</a:t>
             </a:r>
             <a:endParaRPr lang="en-US" dirty="0"/>
           </a:p>
-          <a:p>
-            <a:r>
-              <a:rPr lang="en-US" dirty="0">
-                <a:hlinkClick r:id="rId4"/>
-              </a:rPr>
-              <a:t>@</a:t>
-            </a:r>
-            <a:r>
-              <a:rPr lang="en-US" dirty="0" err="1">
-                <a:hlinkClick r:id="rId4"/>
-              </a:rPr>
-              <a:t>SaridResearch</a:t>
-            </a:r>
-            <a:endParaRPr lang="en-US" dirty="0"/>
-          </a:p>
         </p:txBody>
       </p:sp>
       <p:sp>
         <p:nvSpPr>
-          <p:cNvPr id="4" name="Footer Placeholder 3"/>
+          <p:cNvPr id="4" name="Footer Placeholder 3">
+            <a:extLst>
+              <a:ext uri="{FF2B5EF4-FFF2-40B4-BE49-F238E27FC236}">
+                <a16:creationId xmlns:a16="http://schemas.microsoft.com/office/drawing/2014/main" id="{06D2CDA7-0FCD-4542-B1C5-BD9AE2C81672}"/>
+              </a:ext>
+            </a:extLst>
+          </p:cNvPr>
           <p:cNvSpPr>
             <a:spLocks noGrp="1"/>
           </p:cNvSpPr>
@@ -10033,7 +10657,13 @@
       </p:sp>
       <p:sp>
         <p:nvSpPr>
-          <p:cNvPr id="5" name="Slide Number Placeholder 4"/>
+          <p:cNvPr id="5" name="Slide Number Placeholder 4">
+            <a:extLst>
+              <a:ext uri="{FF2B5EF4-FFF2-40B4-BE49-F238E27FC236}">
+                <a16:creationId xmlns:a16="http://schemas.microsoft.com/office/drawing/2014/main" id="{B59DF997-52E5-4654-942F-75FF8BE9C625}"/>
+              </a:ext>
+            </a:extLst>
+          </p:cNvPr>
           <p:cNvSpPr>
             <a:spLocks noGrp="1"/>
           </p:cNvSpPr>
@@ -10054,333 +10684,10 @@
           </a:p>
         </p:txBody>
       </p:sp>
-      <p:sp>
-        <p:nvSpPr>
-          <p:cNvPr id="6" name="Content Placeholder 2">
-            <a:extLst>
-              <a:ext uri="{FF2B5EF4-FFF2-40B4-BE49-F238E27FC236}">
-                <a16:creationId xmlns:a16="http://schemas.microsoft.com/office/drawing/2014/main" id="{B0537197-6106-4C67-80A8-238C92497769}"/>
-              </a:ext>
-            </a:extLst>
-          </p:cNvPr>
-          <p:cNvSpPr txBox="1">
-            <a:spLocks/>
-          </p:cNvSpPr>
-          <p:nvPr/>
-        </p:nvSpPr>
-        <p:spPr>
-          <a:xfrm>
-            <a:off x="5605670" y="5013819"/>
-            <a:ext cx="3984531" cy="899619"/>
-          </a:xfrm>
-          <a:prstGeom prst="rect">
-            <a:avLst/>
-          </a:prstGeom>
-        </p:spPr>
-        <p:txBody>
-          <a:bodyPr vert="horz" lIns="91440" tIns="45720" rIns="91440" bIns="45720" rtlCol="0" anchor="t">
-            <a:normAutofit/>
-          </a:bodyPr>
-          <a:lstStyle>
-            <a:lvl1pPr indent="0" defTabSz="914400">
-              <a:lnSpc>
-                <a:spcPct val="90000"/>
-              </a:lnSpc>
-              <a:spcBef>
-                <a:spcPts val="1200"/>
-              </a:spcBef>
-              <a:buClr>
-                <a:schemeClr val="accent2"/>
-              </a:buClr>
-              <a:buSzPct val="85000"/>
-              <a:buFont typeface="Wingdings" pitchFamily="2" charset="2"/>
-              <a:buNone/>
-              <a:defRPr sz="2000" b="1">
-                <a:solidFill>
-                  <a:schemeClr val="accent2">
-                    <a:lumMod val="50000"/>
-                  </a:schemeClr>
-                </a:solidFill>
-              </a:defRPr>
-            </a:lvl1pPr>
-            <a:lvl2pPr indent="0" defTabSz="914400">
-              <a:lnSpc>
-                <a:spcPct val="90000"/>
-              </a:lnSpc>
-              <a:spcBef>
-                <a:spcPts val="400"/>
-              </a:spcBef>
-              <a:spcAft>
-                <a:spcPts val="200"/>
-              </a:spcAft>
-              <a:buClr>
-                <a:schemeClr val="accent2"/>
-              </a:buClr>
-              <a:buSzPct val="85000"/>
-              <a:buFont typeface="Wingdings" pitchFamily="2" charset="2"/>
-              <a:buNone/>
-              <a:defRPr>
-                <a:solidFill>
-                  <a:schemeClr val="tx1">
-                    <a:tint val="75000"/>
-                  </a:schemeClr>
-                </a:solidFill>
-              </a:defRPr>
-            </a:lvl2pPr>
-            <a:lvl3pPr indent="0" defTabSz="914400">
-              <a:lnSpc>
-                <a:spcPct val="90000"/>
-              </a:lnSpc>
-              <a:spcBef>
-                <a:spcPts val="400"/>
-              </a:spcBef>
-              <a:spcAft>
-                <a:spcPts val="200"/>
-              </a:spcAft>
-              <a:buClr>
-                <a:schemeClr val="accent2"/>
-              </a:buClr>
-              <a:buSzPct val="85000"/>
-              <a:buFont typeface="Wingdings" pitchFamily="2" charset="2"/>
-              <a:buNone/>
-              <a:defRPr sz="1600">
-                <a:solidFill>
-                  <a:schemeClr val="tx1">
-                    <a:tint val="75000"/>
-                  </a:schemeClr>
-                </a:solidFill>
-              </a:defRPr>
-            </a:lvl3pPr>
-            <a:lvl4pPr indent="0" defTabSz="914400">
-              <a:lnSpc>
-                <a:spcPct val="90000"/>
-              </a:lnSpc>
-              <a:spcBef>
-                <a:spcPts val="400"/>
-              </a:spcBef>
-              <a:spcAft>
-                <a:spcPts val="200"/>
-              </a:spcAft>
-              <a:buClr>
-                <a:schemeClr val="accent2"/>
-              </a:buClr>
-              <a:buSzPct val="85000"/>
-              <a:buFont typeface="Wingdings" pitchFamily="2" charset="2"/>
-              <a:buNone/>
-              <a:defRPr sz="1400">
-                <a:solidFill>
-                  <a:schemeClr val="tx1">
-                    <a:tint val="75000"/>
-                  </a:schemeClr>
-                </a:solidFill>
-              </a:defRPr>
-            </a:lvl4pPr>
-            <a:lvl5pPr indent="0" defTabSz="914400">
-              <a:lnSpc>
-                <a:spcPct val="90000"/>
-              </a:lnSpc>
-              <a:spcBef>
-                <a:spcPts val="400"/>
-              </a:spcBef>
-              <a:spcAft>
-                <a:spcPts val="200"/>
-              </a:spcAft>
-              <a:buClr>
-                <a:schemeClr val="accent2"/>
-              </a:buClr>
-              <a:buSzPct val="85000"/>
-              <a:buFont typeface="Wingdings" pitchFamily="2" charset="2"/>
-              <a:buNone/>
-              <a:defRPr sz="1400">
-                <a:solidFill>
-                  <a:schemeClr val="tx1">
-                    <a:tint val="75000"/>
-                  </a:schemeClr>
-                </a:solidFill>
-              </a:defRPr>
-            </a:lvl5pPr>
-            <a:lvl6pPr indent="0" algn="r" defTabSz="914400" rtl="1">
-              <a:lnSpc>
-                <a:spcPct val="90000"/>
-              </a:lnSpc>
-              <a:spcBef>
-                <a:spcPts val="400"/>
-              </a:spcBef>
-              <a:spcAft>
-                <a:spcPts val="200"/>
-              </a:spcAft>
-              <a:buClr>
-                <a:schemeClr val="accent2"/>
-              </a:buClr>
-              <a:buSzPct val="85000"/>
-              <a:buFont typeface="Wingdings" pitchFamily="2" charset="2"/>
-              <a:buNone/>
-              <a:defRPr sz="1400">
-                <a:solidFill>
-                  <a:schemeClr val="tx1">
-                    <a:tint val="75000"/>
-                  </a:schemeClr>
-                </a:solidFill>
-              </a:defRPr>
-            </a:lvl6pPr>
-            <a:lvl7pPr indent="0" algn="r" defTabSz="914400" rtl="1">
-              <a:lnSpc>
-                <a:spcPct val="90000"/>
-              </a:lnSpc>
-              <a:spcBef>
-                <a:spcPts val="400"/>
-              </a:spcBef>
-              <a:spcAft>
-                <a:spcPts val="200"/>
-              </a:spcAft>
-              <a:buClr>
-                <a:schemeClr val="accent2"/>
-              </a:buClr>
-              <a:buSzPct val="85000"/>
-              <a:buFont typeface="Wingdings" pitchFamily="2" charset="2"/>
-              <a:buNone/>
-              <a:defRPr sz="1400">
-                <a:solidFill>
-                  <a:schemeClr val="tx1">
-                    <a:tint val="75000"/>
-                  </a:schemeClr>
-                </a:solidFill>
-              </a:defRPr>
-            </a:lvl7pPr>
-            <a:lvl8pPr indent="0" algn="r" defTabSz="914400" rtl="1">
-              <a:lnSpc>
-                <a:spcPct val="90000"/>
-              </a:lnSpc>
-              <a:spcBef>
-                <a:spcPts val="400"/>
-              </a:spcBef>
-              <a:spcAft>
-                <a:spcPts val="200"/>
-              </a:spcAft>
-              <a:buClr>
-                <a:schemeClr val="accent2"/>
-              </a:buClr>
-              <a:buSzPct val="85000"/>
-              <a:buFont typeface="Wingdings" pitchFamily="2" charset="2"/>
-              <a:buNone/>
-              <a:defRPr sz="1400">
-                <a:solidFill>
-                  <a:schemeClr val="tx1">
-                    <a:tint val="75000"/>
-                  </a:schemeClr>
-                </a:solidFill>
-              </a:defRPr>
-            </a:lvl8pPr>
-            <a:lvl9pPr indent="0" algn="r" defTabSz="914400" rtl="1">
-              <a:lnSpc>
-                <a:spcPct val="90000"/>
-              </a:lnSpc>
-              <a:spcBef>
-                <a:spcPts val="400"/>
-              </a:spcBef>
-              <a:spcAft>
-                <a:spcPts val="200"/>
-              </a:spcAft>
-              <a:buClr>
-                <a:schemeClr val="accent2"/>
-              </a:buClr>
-              <a:buSzPct val="85000"/>
-              <a:buFont typeface="Wingdings" pitchFamily="2" charset="2"/>
-              <a:buNone/>
-              <a:defRPr sz="1400">
-                <a:solidFill>
-                  <a:schemeClr val="tx1">
-                    <a:tint val="75000"/>
-                  </a:schemeClr>
-                </a:solidFill>
-              </a:defRPr>
-            </a:lvl9pPr>
-          </a:lstStyle>
-          <a:p>
-            <a:r>
-              <a:rPr lang="en-US" dirty="0"/>
-              <a:t>https://www.sarid-ins.co.il</a:t>
-            </a:r>
-          </a:p>
-          <a:p>
-            <a:r>
-              <a:rPr lang="en-US" dirty="0"/>
-              <a:t>https://adisarid.github.io</a:t>
-            </a:r>
-            <a:endParaRPr lang="he-IL" dirty="0"/>
-          </a:p>
-        </p:txBody>
-      </p:sp>
-      <p:pic>
-        <p:nvPicPr>
-          <p:cNvPr id="7" name="Picture 6">
-            <a:extLst>
-              <a:ext uri="{FF2B5EF4-FFF2-40B4-BE49-F238E27FC236}">
-                <a16:creationId xmlns:a16="http://schemas.microsoft.com/office/drawing/2014/main" id="{7F157C0F-3423-4895-9D7B-44877F171C54}"/>
-              </a:ext>
-            </a:extLst>
-          </p:cNvPr>
-          <p:cNvPicPr>
-            <a:picLocks noChangeAspect="1"/>
-          </p:cNvPicPr>
-          <p:nvPr/>
-        </p:nvPicPr>
-        <p:blipFill>
-          <a:blip r:embed="rId5">
-            <a:extLst>
-              <a:ext uri="{28A0092B-C50C-407E-A947-70E740481C1C}">
-                <a14:useLocalDpi xmlns:a14="http://schemas.microsoft.com/office/drawing/2010/main" val="0"/>
-              </a:ext>
-            </a:extLst>
-          </a:blip>
-          <a:stretch>
-            <a:fillRect/>
-          </a:stretch>
-        </p:blipFill>
-        <p:spPr>
-          <a:xfrm>
-            <a:off x="9826149" y="303698"/>
-            <a:ext cx="2089730" cy="849826"/>
-          </a:xfrm>
-          <a:prstGeom prst="rect">
-            <a:avLst/>
-          </a:prstGeom>
-        </p:spPr>
-      </p:pic>
-      <p:pic>
-        <p:nvPicPr>
-          <p:cNvPr id="9" name="Picture 8" descr="A picture containing plant&#10;&#10;Description automatically generated">
-            <a:extLst>
-              <a:ext uri="{FF2B5EF4-FFF2-40B4-BE49-F238E27FC236}">
-                <a16:creationId xmlns:a16="http://schemas.microsoft.com/office/drawing/2014/main" id="{DB0DF64B-229B-4100-9336-BBBFFE41BECC}"/>
-              </a:ext>
-            </a:extLst>
-          </p:cNvPr>
-          <p:cNvPicPr>
-            <a:picLocks noChangeAspect="1"/>
-          </p:cNvPicPr>
-          <p:nvPr/>
-        </p:nvPicPr>
-        <p:blipFill>
-          <a:blip r:embed="rId6"/>
-          <a:stretch>
-            <a:fillRect/>
-          </a:stretch>
-        </p:blipFill>
-        <p:spPr>
-          <a:xfrm>
-            <a:off x="1638176" y="5583207"/>
-            <a:ext cx="585216" cy="585216"/>
-          </a:xfrm>
-          <a:prstGeom prst="rect">
-            <a:avLst/>
-          </a:prstGeom>
-        </p:spPr>
-      </p:pic>
     </p:spTree>
     <p:extLst>
       <p:ext uri="{BB962C8B-B14F-4D97-AF65-F5344CB8AC3E}">
-        <p14:creationId xmlns:p14="http://schemas.microsoft.com/office/powerpoint/2010/main" val="2362242755"/>
+        <p14:creationId xmlns:p14="http://schemas.microsoft.com/office/powerpoint/2010/main" val="2169577064"/>
       </p:ext>
     </p:extLst>
   </p:cSld>

</xml_diff>